<commit_message>
Ajout des dernières modifications
</commit_message>
<xml_diff>
--- a/Demo Projet final Angular — PharmaTrack Burkina.pptx
+++ b/Demo Projet final Angular — PharmaTrack Burkina.pptx
@@ -6459,14 +6459,19 @@
           <a:p>
             <a:r>
               <a:rPr lang="fr-FR" dirty="0"/>
-              <a:t>Page de connexion Admin qui as accès a tout</a:t>
+              <a:t>Page de connexion Admin qui as accès a tout (admin/admin)</a:t>
             </a:r>
           </a:p>
           <a:p>
             <a:r>
               <a:rPr lang="fr-FR" dirty="0"/>
-              <a:t>Et  User qui  n’as accès qu’au Tableau de bord et aux ventes</a:t>
-            </a:r>
+              <a:t>Et  User qui  n’as accès qu’au Tableau de bord et </a:t>
+            </a:r>
+            <a:r>
+              <a:rPr lang="fr-FR"/>
+              <a:t>aux ventes (user/user)</a:t>
+            </a:r>
+            <a:endParaRPr lang="fr-FR" dirty="0"/>
           </a:p>
           <a:p>
             <a:r>

</xml_diff>